<commit_message>
Encryption points for demo 3
</commit_message>
<xml_diff>
--- a/Project Documentation/Demos/Demo 03/Demo 03.pptx
+++ b/Project Documentation/Demos/Demo 03/Demo 03.pptx
@@ -122,7 +122,7 @@
   </p:defaultTextStyle>
   <p:extLst>
     <p:ext uri="{EFAFB233-063F-42B5-8137-9DF3F51BA10A}">
-      <p15:sldGuideLst xmlns:p15="http://schemas.microsoft.com/office/powerpoint/2012/main">
+      <p15:sldGuideLst xmlns:p15="http://schemas.microsoft.com/office/powerpoint/2012/main" xmlns="">
         <p15:guide id="1" orient="horz" pos="2160" userDrawn="1">
           <p15:clr>
             <a:srgbClr val="A4A3A4"/>
@@ -196,7 +196,7 @@
       </p15:sldGuideLst>
     </p:ext>
     <p:ext uri="{2D200454-40CA-4A62-9FC3-DE9A4176ACB9}">
-      <p15:notesGuideLst xmlns:p15="http://schemas.microsoft.com/office/powerpoint/2012/main"/>
+      <p15:notesGuideLst xmlns:p15="http://schemas.microsoft.com/office/powerpoint/2012/main" xmlns=""/>
     </p:ext>
   </p:extLst>
 </p:presentation>
@@ -1420,8 +1420,8 @@
     <dgm:cxn modelId="{1D3CF703-E501-4E1C-A175-0ABEA86722C9}" type="presOf" srcId="{F47371DB-8BEA-432B-ADA0-92D74E0702F9}" destId="{B0AFBA69-F6EE-4B41-94B1-52466432E21A}" srcOrd="0" destOrd="0" presId="urn:microsoft.com/office/officeart/2005/8/layout/process2"/>
     <dgm:cxn modelId="{AA3694B8-C57A-41A5-8AF9-EE6EA4412041}" type="presOf" srcId="{AAD92323-C489-44B1-AC4F-BF3E44649CD1}" destId="{77250FC4-3CD4-4BD3-83CF-DF8D02B9DCB1}" srcOrd="0" destOrd="0" presId="urn:microsoft.com/office/officeart/2005/8/layout/process2"/>
     <dgm:cxn modelId="{9ED44448-A612-415B-9510-0317A3DF62CA}" type="presOf" srcId="{2D947E25-C16B-42FD-80F9-097235D840FE}" destId="{E4E9F33E-FEB6-4B1D-B1CA-32DE732DD70F}" srcOrd="1" destOrd="0" presId="urn:microsoft.com/office/officeart/2005/8/layout/process2"/>
+    <dgm:cxn modelId="{D115FF46-9CA3-4137-A994-3C5C36CCAF32}" type="presOf" srcId="{CBE68F96-89C8-4389-B3B0-A60C07AFA6E6}" destId="{BBD1517F-8595-43FF-B8A2-BFDF5EABC173}" srcOrd="0" destOrd="0" presId="urn:microsoft.com/office/officeart/2005/8/layout/process2"/>
     <dgm:cxn modelId="{87527954-69AA-4C26-8DC2-0CA36D5FE8EA}" srcId="{CBE68F96-89C8-4389-B3B0-A60C07AFA6E6}" destId="{B6B66AB5-6C31-4B5F-93E1-8F76E49BB650}" srcOrd="1" destOrd="0" parTransId="{1D8308EB-D457-4B19-9144-B6BDC74BBD90}" sibTransId="{A45D5F63-C5E3-47F8-AB0E-319C4686FB99}"/>
-    <dgm:cxn modelId="{D115FF46-9CA3-4137-A994-3C5C36CCAF32}" type="presOf" srcId="{CBE68F96-89C8-4389-B3B0-A60C07AFA6E6}" destId="{BBD1517F-8595-43FF-B8A2-BFDF5EABC173}" srcOrd="0" destOrd="0" presId="urn:microsoft.com/office/officeart/2005/8/layout/process2"/>
     <dgm:cxn modelId="{1B729D1A-218D-441F-8AE4-C30C351F3568}" type="presOf" srcId="{1A75F6BB-B0E0-4EE8-9800-137D7E40F05F}" destId="{2AA5EB6B-6F84-481E-A18B-83054F65A1F2}" srcOrd="0" destOrd="0" presId="urn:microsoft.com/office/officeart/2005/8/layout/process2"/>
     <dgm:cxn modelId="{D1E7BF08-1A44-4E9F-944A-F615278ED7DC}" type="presOf" srcId="{D729FD14-48D0-4CC4-9926-F3919B7E762C}" destId="{C6F8793C-44C2-4F66-9B04-8FD07C3AE97D}" srcOrd="1" destOrd="0" presId="urn:microsoft.com/office/officeart/2005/8/layout/process2"/>
     <dgm:cxn modelId="{D74F3D68-B0C7-46F7-8DA0-E768035919B4}" type="presParOf" srcId="{BBD1517F-8595-43FF-B8A2-BFDF5EABC173}" destId="{77250FC4-3CD4-4BD3-83CF-DF8D02B9DCB1}" srcOrd="0" destOrd="0" presId="urn:microsoft.com/office/officeart/2005/8/layout/process2"/>
@@ -1466,8 +1466,8 @@
       </dsp:nvSpPr>
       <dsp:spPr>
         <a:xfrm>
-          <a:off x="101089" y="16023"/>
-          <a:ext cx="1936799" cy="492667"/>
+          <a:off x="107990" y="16023"/>
+          <a:ext cx="1932565" cy="492667"/>
         </a:xfrm>
         <a:prstGeom prst="roundRect">
           <a:avLst>
@@ -1535,8 +1535,8 @@
         </a:p>
       </dsp:txBody>
       <dsp:txXfrm>
-        <a:off x="115519" y="30453"/>
-        <a:ext cx="1907939" cy="463807"/>
+        <a:off x="122420" y="30453"/>
+        <a:ext cx="1903705" cy="463807"/>
       </dsp:txXfrm>
     </dsp:sp>
     <dsp:sp modelId="{0FA3274E-7887-46B3-8442-535265B3BE97}">
@@ -1546,7 +1546,7 @@
       </dsp:nvSpPr>
       <dsp:spPr>
         <a:xfrm rot="5400000">
-          <a:off x="977113" y="521008"/>
+          <a:off x="981898" y="521008"/>
           <a:ext cx="184750" cy="221700"/>
         </a:xfrm>
         <a:prstGeom prst="rightArrow">
@@ -1604,7 +1604,7 @@
         </a:p>
       </dsp:txBody>
       <dsp:txXfrm rot="-5400000">
-        <a:off x="1002979" y="539483"/>
+        <a:off x="1007764" y="539483"/>
         <a:ext cx="133020" cy="129325"/>
       </dsp:txXfrm>
     </dsp:sp>
@@ -1615,8 +1615,8 @@
       </dsp:nvSpPr>
       <dsp:spPr>
         <a:xfrm>
-          <a:off x="101089" y="755025"/>
-          <a:ext cx="1936799" cy="492667"/>
+          <a:off x="107990" y="755025"/>
+          <a:ext cx="1932565" cy="492667"/>
         </a:xfrm>
         <a:prstGeom prst="roundRect">
           <a:avLst>
@@ -1684,8 +1684,8 @@
         </a:p>
       </dsp:txBody>
       <dsp:txXfrm>
-        <a:off x="115519" y="769455"/>
-        <a:ext cx="1907939" cy="463807"/>
+        <a:off x="122420" y="769455"/>
+        <a:ext cx="1903705" cy="463807"/>
       </dsp:txXfrm>
     </dsp:sp>
     <dsp:sp modelId="{CD4CD681-E631-4A2A-8903-86E13A46DBBC}">
@@ -1695,7 +1695,7 @@
       </dsp:nvSpPr>
       <dsp:spPr>
         <a:xfrm rot="5400000">
-          <a:off x="977113" y="1260009"/>
+          <a:off x="981898" y="1260009"/>
           <a:ext cx="184750" cy="221700"/>
         </a:xfrm>
         <a:prstGeom prst="rightArrow">
@@ -1753,7 +1753,7 @@
         </a:p>
       </dsp:txBody>
       <dsp:txXfrm rot="-5400000">
-        <a:off x="1002979" y="1278484"/>
+        <a:off x="1007764" y="1278484"/>
         <a:ext cx="133020" cy="129325"/>
       </dsp:txXfrm>
     </dsp:sp>
@@ -1764,8 +1764,8 @@
       </dsp:nvSpPr>
       <dsp:spPr>
         <a:xfrm>
-          <a:off x="101089" y="1494026"/>
-          <a:ext cx="1936799" cy="492667"/>
+          <a:off x="107990" y="1494026"/>
+          <a:ext cx="1932565" cy="492667"/>
         </a:xfrm>
         <a:prstGeom prst="roundRect">
           <a:avLst>
@@ -1833,8 +1833,8 @@
         </a:p>
       </dsp:txBody>
       <dsp:txXfrm>
-        <a:off x="115519" y="1508456"/>
-        <a:ext cx="1907939" cy="463807"/>
+        <a:off x="122420" y="1508456"/>
+        <a:ext cx="1903705" cy="463807"/>
       </dsp:txXfrm>
     </dsp:sp>
     <dsp:sp modelId="{6BA4E6BB-2803-441C-AFDF-3F1A3E073117}">
@@ -1844,7 +1844,7 @@
       </dsp:nvSpPr>
       <dsp:spPr>
         <a:xfrm rot="5400000">
-          <a:off x="977113" y="1999011"/>
+          <a:off x="981898" y="1999011"/>
           <a:ext cx="184750" cy="221700"/>
         </a:xfrm>
         <a:prstGeom prst="rightArrow">
@@ -1902,7 +1902,7 @@
         </a:p>
       </dsp:txBody>
       <dsp:txXfrm rot="-5400000">
-        <a:off x="1002979" y="2017486"/>
+        <a:off x="1007764" y="2017486"/>
         <a:ext cx="133020" cy="129325"/>
       </dsp:txXfrm>
     </dsp:sp>
@@ -1913,8 +1913,8 @@
       </dsp:nvSpPr>
       <dsp:spPr>
         <a:xfrm>
-          <a:off x="101089" y="2233028"/>
-          <a:ext cx="1936799" cy="492667"/>
+          <a:off x="107990" y="2233028"/>
+          <a:ext cx="1932565" cy="492667"/>
         </a:xfrm>
         <a:prstGeom prst="roundRect">
           <a:avLst>
@@ -1981,8 +1981,8 @@
         </a:p>
       </dsp:txBody>
       <dsp:txXfrm>
-        <a:off x="115519" y="2247458"/>
-        <a:ext cx="1907939" cy="463807"/>
+        <a:off x="122420" y="2247458"/>
+        <a:ext cx="1903705" cy="463807"/>
       </dsp:txXfrm>
     </dsp:sp>
     <dsp:sp modelId="{2354E252-F4A1-4619-87D5-32227FCB99F2}">
@@ -1992,7 +1992,7 @@
       </dsp:nvSpPr>
       <dsp:spPr>
         <a:xfrm rot="5400000">
-          <a:off x="977113" y="2738012"/>
+          <a:off x="981898" y="2738012"/>
           <a:ext cx="184750" cy="221700"/>
         </a:xfrm>
         <a:prstGeom prst="rightArrow">
@@ -2050,7 +2050,7 @@
         </a:p>
       </dsp:txBody>
       <dsp:txXfrm rot="-5400000">
-        <a:off x="1002979" y="2756487"/>
+        <a:off x="1007764" y="2756487"/>
         <a:ext cx="133020" cy="129325"/>
       </dsp:txXfrm>
     </dsp:sp>
@@ -2061,8 +2061,8 @@
       </dsp:nvSpPr>
       <dsp:spPr>
         <a:xfrm>
-          <a:off x="101089" y="2972029"/>
-          <a:ext cx="1936799" cy="492667"/>
+          <a:off x="107990" y="2972029"/>
+          <a:ext cx="1932565" cy="492667"/>
         </a:xfrm>
         <a:prstGeom prst="roundRect">
           <a:avLst>
@@ -2130,8 +2130,8 @@
         </a:p>
       </dsp:txBody>
       <dsp:txXfrm>
-        <a:off x="115519" y="2986459"/>
-        <a:ext cx="1907939" cy="463807"/>
+        <a:off x="122420" y="2986459"/>
+        <a:ext cx="1903705" cy="463807"/>
       </dsp:txXfrm>
     </dsp:sp>
     <dsp:sp modelId="{AD0CCC23-1F57-49C7-B76F-B4723BE73D69}">
@@ -2141,7 +2141,7 @@
       </dsp:nvSpPr>
       <dsp:spPr>
         <a:xfrm rot="5400000">
-          <a:off x="1000404" y="3445959"/>
+          <a:off x="1005189" y="3445959"/>
           <a:ext cx="138169" cy="221700"/>
         </a:xfrm>
         <a:prstGeom prst="rightArrow">
@@ -2199,7 +2199,7 @@
         </a:p>
       </dsp:txBody>
       <dsp:txXfrm rot="-5400000">
-        <a:off x="1002979" y="3487725"/>
+        <a:off x="1007764" y="3487725"/>
         <a:ext cx="133020" cy="96718"/>
       </dsp:txXfrm>
     </dsp:sp>
@@ -2210,8 +2210,8 @@
       </dsp:nvSpPr>
       <dsp:spPr>
         <a:xfrm>
-          <a:off x="101089" y="3648922"/>
-          <a:ext cx="1936799" cy="492667"/>
+          <a:off x="107990" y="3648922"/>
+          <a:ext cx="1932565" cy="492667"/>
         </a:xfrm>
         <a:prstGeom prst="roundRect">
           <a:avLst>
@@ -2279,8 +2279,8 @@
         </a:p>
       </dsp:txBody>
       <dsp:txXfrm>
-        <a:off x="115519" y="3663352"/>
-        <a:ext cx="1907939" cy="463807"/>
+        <a:off x="122420" y="3663352"/>
+        <a:ext cx="1903705" cy="463807"/>
       </dsp:txXfrm>
     </dsp:sp>
   </dsp:spTree>
@@ -8440,9 +8440,6 @@
               </a:rPr>
               <a:t>David’s slide</a:t>
             </a:r>
-            <a:endParaRPr lang="en-ZA" sz="2400" dirty="0" smtClean="0">
-              <a:latin typeface="+mj-lt"/>
-            </a:endParaRPr>
           </a:p>
         </p:txBody>
       </p:sp>
@@ -8569,9 +8566,6 @@
               </a:rPr>
               <a:t>Paul’s  slide</a:t>
             </a:r>
-            <a:endParaRPr lang="en-ZA" sz="2400" dirty="0" smtClean="0">
-              <a:latin typeface="+mj-lt"/>
-            </a:endParaRPr>
           </a:p>
         </p:txBody>
       </p:sp>
@@ -8585,13 +8579,13 @@
   <p:clrMapOvr>
     <a:masterClrMapping/>
   </p:clrMapOvr>
-  <mc:AlternateContent xmlns:mc="http://schemas.openxmlformats.org/markup-compatibility/2006">
-    <mc:Choice xmlns:p14="http://schemas.microsoft.com/office/powerpoint/2010/main" Requires="p14">
+  <mc:AlternateContent xmlns:mc="http://schemas.openxmlformats.org/markup-compatibility/2006" xmlns:p14="http://schemas.microsoft.com/office/powerpoint/2010/main">
+    <mc:Choice Requires="p14">
       <p:transition spd="med" p14:dur="700">
         <p:fade/>
       </p:transition>
     </mc:Choice>
-    <mc:Fallback>
+    <mc:Fallback xmlns="">
       <p:transition spd="med">
         <p:fade/>
       </p:transition>
@@ -8655,7 +8649,7 @@
         </p:nvSpPr>
         <p:spPr bwMode="auto">
           <a:xfrm>
-            <a:off x="899592" y="2780928"/>
+            <a:off x="881501" y="908720"/>
             <a:ext cx="6516798" cy="1872208"/>
           </a:xfrm>
           <a:prstGeom prst="rect">
@@ -8694,7 +8688,39 @@
               <a:rPr lang="en-ZA" sz="2400" dirty="0" smtClean="0">
                 <a:latin typeface="+mj-lt"/>
               </a:rPr>
-              <a:t>P-man’s slide</a:t>
+              <a:t>AES256 (Asymmetric vs</a:t>
+            </a:r>
+            <a:r>
+              <a:rPr lang="en-ZA" sz="2400" dirty="0"/>
+              <a:t>.</a:t>
+            </a:r>
+            <a:r>
+              <a:rPr lang="en-ZA" sz="2400" dirty="0" smtClean="0">
+                <a:latin typeface="+mj-lt"/>
+              </a:rPr>
+              <a:t> Symmetric)</a:t>
+            </a:r>
+          </a:p>
+          <a:p>
+            <a:pPr marL="571500" indent="-571500">
+              <a:buFont typeface="Arial" pitchFamily="34" charset="0"/>
+              <a:buChar char="•"/>
+            </a:pPr>
+            <a:r>
+              <a:rPr lang="en-ZA" sz="2400" dirty="0" smtClean="0"/>
+              <a:t>Key Exchange (DH vs. RSA)</a:t>
+            </a:r>
+          </a:p>
+          <a:p>
+            <a:pPr marL="571500" indent="-571500">
+              <a:buFont typeface="Arial" pitchFamily="34" charset="0"/>
+              <a:buChar char="•"/>
+            </a:pPr>
+            <a:r>
+              <a:rPr lang="en-ZA" sz="2400" dirty="0" smtClean="0">
+                <a:latin typeface="+mj-lt"/>
+              </a:rPr>
+              <a:t>SHA256</a:t>
             </a:r>
             <a:endParaRPr lang="en-ZA" sz="2400" dirty="0" smtClean="0">
               <a:latin typeface="+mj-lt"/>
@@ -8712,13 +8738,13 @@
   <p:clrMapOvr>
     <a:masterClrMapping/>
   </p:clrMapOvr>
-  <mc:AlternateContent xmlns:mc="http://schemas.openxmlformats.org/markup-compatibility/2006">
-    <mc:Choice xmlns:p14="http://schemas.microsoft.com/office/powerpoint/2010/main" Requires="p14">
+  <mc:AlternateContent xmlns:mc="http://schemas.openxmlformats.org/markup-compatibility/2006" xmlns:p14="http://schemas.microsoft.com/office/powerpoint/2010/main">
+    <mc:Choice Requires="p14">
       <p:transition spd="med" p14:dur="700">
         <p:fade/>
       </p:transition>
     </mc:Choice>
-    <mc:Fallback>
+    <mc:Fallback xmlns="">
       <p:transition spd="med">
         <p:fade/>
       </p:transition>
@@ -8830,9 +8856,6 @@
               </a:rPr>
               <a:t> UI slide</a:t>
             </a:r>
-            <a:endParaRPr lang="en-ZA" sz="2400" dirty="0" smtClean="0">
-              <a:latin typeface="+mj-lt"/>
-            </a:endParaRPr>
           </a:p>
         </p:txBody>
       </p:sp>
@@ -8965,9 +8988,6 @@
               </a:rPr>
               <a:t>Jess’ UI Slide</a:t>
             </a:r>
-            <a:endParaRPr lang="en-ZA" sz="2400" dirty="0" smtClean="0">
-              <a:latin typeface="+mj-lt"/>
-            </a:endParaRPr>
           </a:p>
         </p:txBody>
       </p:sp>
@@ -9175,7 +9195,6 @@
               <a:rPr lang="en-ZA" dirty="0" smtClean="0"/>
               <a:t>Current Phase</a:t>
             </a:r>
-            <a:endParaRPr lang="en-ZA" dirty="0" smtClean="0"/>
           </a:p>
         </p:txBody>
       </p:sp>
@@ -9208,7 +9227,6 @@
               <a:rPr lang="en-ZA" dirty="0" smtClean="0"/>
               <a:t>End of September</a:t>
             </a:r>
-            <a:endParaRPr lang="en-ZA" dirty="0" smtClean="0"/>
           </a:p>
         </p:txBody>
       </p:sp>
@@ -9239,11 +9257,7 @@
           <a:p>
             <a:r>
               <a:rPr lang="en-ZA" dirty="0" smtClean="0"/>
-              <a:t>End of September </a:t>
-            </a:r>
-            <a:r>
-              <a:rPr lang="en-ZA" dirty="0" smtClean="0"/>
-              <a:t>(after product finalization)</a:t>
+              <a:t>End of September (after product finalization)</a:t>
             </a:r>
           </a:p>
         </p:txBody>
@@ -9715,7 +9729,7 @@
   <a:extraClrSchemeLst/>
   <a:extLst>
     <a:ext uri="{05A4C25C-085E-4340-85A3-A5531E510DB2}">
-      <thm15:themeFamily xmlns:thm15="http://schemas.microsoft.com/office/thememl/2012/main" name="Business strategy presentation" id="{8652783A-F43B-4C47-8F3C-48F967BE0382}" vid="{232EED29-0899-40B2-8969-E379F11A5395}"/>
+      <thm15:themeFamily xmlns:thm15="http://schemas.microsoft.com/office/thememl/2012/main" xmlns="" name="Business strategy presentation" id="{8652783A-F43B-4C47-8F3C-48F967BE0382}" vid="{232EED29-0899-40B2-8969-E379F11A5395}"/>
     </a:ext>
   </a:extLst>
 </a:theme>

</xml_diff>